<commit_message>
AutoCommit_24 ноября 2023 г. 11:46:06_SibNout2023
</commit_message>
<xml_diff>
--- a/ПишемПрезентацию/Педсовет_v1.pptx
+++ b/ПишемПрезентацию/Педсовет_v1.pptx
@@ -255,7 +255,7 @@
           <p:cNvPr id="2" name="Заголовок 1">
             <a:extLst>
               <a:ext uri="{FF2B5EF4-FFF2-40B4-BE49-F238E27FC236}">
-                <a16:creationId xmlns="" xmlns:a16="http://schemas.microsoft.com/office/drawing/2014/main" id="{E058E1F0-EC93-B41F-2546-67FD5E3717AE}"/>
+                <a16:creationId xmlns:a16="http://schemas.microsoft.com/office/drawing/2014/main" xmlns="" id="{E058E1F0-EC93-B41F-2546-67FD5E3717AE}"/>
               </a:ext>
             </a:extLst>
           </p:cNvPr>
@@ -292,7 +292,7 @@
           <p:cNvPr id="3" name="Подзаголовок 2">
             <a:extLst>
               <a:ext uri="{FF2B5EF4-FFF2-40B4-BE49-F238E27FC236}">
-                <a16:creationId xmlns="" xmlns:a16="http://schemas.microsoft.com/office/drawing/2014/main" id="{354E726B-00BF-CF7E-EDD0-C6DD40574D60}"/>
+                <a16:creationId xmlns:a16="http://schemas.microsoft.com/office/drawing/2014/main" xmlns="" id="{354E726B-00BF-CF7E-EDD0-C6DD40574D60}"/>
               </a:ext>
             </a:extLst>
           </p:cNvPr>
@@ -362,7 +362,7 @@
           <p:cNvPr id="4" name="Дата 3">
             <a:extLst>
               <a:ext uri="{FF2B5EF4-FFF2-40B4-BE49-F238E27FC236}">
-                <a16:creationId xmlns="" xmlns:a16="http://schemas.microsoft.com/office/drawing/2014/main" id="{D9395135-9217-2EB3-157D-307D097EC4F9}"/>
+                <a16:creationId xmlns:a16="http://schemas.microsoft.com/office/drawing/2014/main" xmlns="" id="{D9395135-9217-2EB3-157D-307D097EC4F9}"/>
               </a:ext>
             </a:extLst>
           </p:cNvPr>
@@ -391,7 +391,7 @@
           <p:cNvPr id="5" name="Нижний колонтитул 4">
             <a:extLst>
               <a:ext uri="{FF2B5EF4-FFF2-40B4-BE49-F238E27FC236}">
-                <a16:creationId xmlns="" xmlns:a16="http://schemas.microsoft.com/office/drawing/2014/main" id="{03F655B2-C267-AB6E-4FC7-4492338AEDCE}"/>
+                <a16:creationId xmlns:a16="http://schemas.microsoft.com/office/drawing/2014/main" xmlns="" id="{03F655B2-C267-AB6E-4FC7-4492338AEDCE}"/>
               </a:ext>
             </a:extLst>
           </p:cNvPr>
@@ -416,7 +416,7 @@
           <p:cNvPr id="6" name="Номер слайда 5">
             <a:extLst>
               <a:ext uri="{FF2B5EF4-FFF2-40B4-BE49-F238E27FC236}">
-                <a16:creationId xmlns="" xmlns:a16="http://schemas.microsoft.com/office/drawing/2014/main" id="{1077A0E7-7A6A-DCDB-8617-99BC6155B88C}"/>
+                <a16:creationId xmlns:a16="http://schemas.microsoft.com/office/drawing/2014/main" xmlns="" id="{1077A0E7-7A6A-DCDB-8617-99BC6155B88C}"/>
               </a:ext>
             </a:extLst>
           </p:cNvPr>
@@ -475,7 +475,7 @@
           <p:cNvPr id="2" name="Заголовок 1">
             <a:extLst>
               <a:ext uri="{FF2B5EF4-FFF2-40B4-BE49-F238E27FC236}">
-                <a16:creationId xmlns="" xmlns:a16="http://schemas.microsoft.com/office/drawing/2014/main" id="{83D21FD2-DD80-C468-B839-CE0108E93AA8}"/>
+                <a16:creationId xmlns:a16="http://schemas.microsoft.com/office/drawing/2014/main" xmlns="" id="{83D21FD2-DD80-C468-B839-CE0108E93AA8}"/>
               </a:ext>
             </a:extLst>
           </p:cNvPr>
@@ -503,7 +503,7 @@
           <p:cNvPr id="3" name="Вертикальный текст 2">
             <a:extLst>
               <a:ext uri="{FF2B5EF4-FFF2-40B4-BE49-F238E27FC236}">
-                <a16:creationId xmlns="" xmlns:a16="http://schemas.microsoft.com/office/drawing/2014/main" id="{95EA54D0-AEC6-7359-E62F-240DD192E358}"/>
+                <a16:creationId xmlns:a16="http://schemas.microsoft.com/office/drawing/2014/main" xmlns="" id="{95EA54D0-AEC6-7359-E62F-240DD192E358}"/>
               </a:ext>
             </a:extLst>
           </p:cNvPr>
@@ -560,7 +560,7 @@
           <p:cNvPr id="4" name="Дата 3">
             <a:extLst>
               <a:ext uri="{FF2B5EF4-FFF2-40B4-BE49-F238E27FC236}">
-                <a16:creationId xmlns="" xmlns:a16="http://schemas.microsoft.com/office/drawing/2014/main" id="{825531B8-DA76-38E5-E126-F802730D113F}"/>
+                <a16:creationId xmlns:a16="http://schemas.microsoft.com/office/drawing/2014/main" xmlns="" id="{825531B8-DA76-38E5-E126-F802730D113F}"/>
               </a:ext>
             </a:extLst>
           </p:cNvPr>
@@ -589,7 +589,7 @@
           <p:cNvPr id="5" name="Нижний колонтитул 4">
             <a:extLst>
               <a:ext uri="{FF2B5EF4-FFF2-40B4-BE49-F238E27FC236}">
-                <a16:creationId xmlns="" xmlns:a16="http://schemas.microsoft.com/office/drawing/2014/main" id="{FB07E0B4-E2DF-05EB-DED1-7A665A6E9B94}"/>
+                <a16:creationId xmlns:a16="http://schemas.microsoft.com/office/drawing/2014/main" xmlns="" id="{FB07E0B4-E2DF-05EB-DED1-7A665A6E9B94}"/>
               </a:ext>
             </a:extLst>
           </p:cNvPr>
@@ -614,7 +614,7 @@
           <p:cNvPr id="6" name="Номер слайда 5">
             <a:extLst>
               <a:ext uri="{FF2B5EF4-FFF2-40B4-BE49-F238E27FC236}">
-                <a16:creationId xmlns="" xmlns:a16="http://schemas.microsoft.com/office/drawing/2014/main" id="{238C9F5D-FE64-7740-D511-93C207249258}"/>
+                <a16:creationId xmlns:a16="http://schemas.microsoft.com/office/drawing/2014/main" xmlns="" id="{238C9F5D-FE64-7740-D511-93C207249258}"/>
               </a:ext>
             </a:extLst>
           </p:cNvPr>
@@ -673,7 +673,7 @@
           <p:cNvPr id="2" name="Вертикальный заголовок 1">
             <a:extLst>
               <a:ext uri="{FF2B5EF4-FFF2-40B4-BE49-F238E27FC236}">
-                <a16:creationId xmlns="" xmlns:a16="http://schemas.microsoft.com/office/drawing/2014/main" id="{53D9B2A6-26C9-73BE-8613-328F699E7D3E}"/>
+                <a16:creationId xmlns:a16="http://schemas.microsoft.com/office/drawing/2014/main" xmlns="" id="{53D9B2A6-26C9-73BE-8613-328F699E7D3E}"/>
               </a:ext>
             </a:extLst>
           </p:cNvPr>
@@ -706,7 +706,7 @@
           <p:cNvPr id="3" name="Вертикальный текст 2">
             <a:extLst>
               <a:ext uri="{FF2B5EF4-FFF2-40B4-BE49-F238E27FC236}">
-                <a16:creationId xmlns="" xmlns:a16="http://schemas.microsoft.com/office/drawing/2014/main" id="{E7E547CC-2DCC-85CB-31AD-86899E8E5843}"/>
+                <a16:creationId xmlns:a16="http://schemas.microsoft.com/office/drawing/2014/main" xmlns="" id="{E7E547CC-2DCC-85CB-31AD-86899E8E5843}"/>
               </a:ext>
             </a:extLst>
           </p:cNvPr>
@@ -768,7 +768,7 @@
           <p:cNvPr id="4" name="Дата 3">
             <a:extLst>
               <a:ext uri="{FF2B5EF4-FFF2-40B4-BE49-F238E27FC236}">
-                <a16:creationId xmlns="" xmlns:a16="http://schemas.microsoft.com/office/drawing/2014/main" id="{BAD467FF-5285-62D1-2676-9B2AA5FF24D7}"/>
+                <a16:creationId xmlns:a16="http://schemas.microsoft.com/office/drawing/2014/main" xmlns="" id="{BAD467FF-5285-62D1-2676-9B2AA5FF24D7}"/>
               </a:ext>
             </a:extLst>
           </p:cNvPr>
@@ -797,7 +797,7 @@
           <p:cNvPr id="5" name="Нижний колонтитул 4">
             <a:extLst>
               <a:ext uri="{FF2B5EF4-FFF2-40B4-BE49-F238E27FC236}">
-                <a16:creationId xmlns="" xmlns:a16="http://schemas.microsoft.com/office/drawing/2014/main" id="{94A58705-A671-6953-2332-5DA4545946BF}"/>
+                <a16:creationId xmlns:a16="http://schemas.microsoft.com/office/drawing/2014/main" xmlns="" id="{94A58705-A671-6953-2332-5DA4545946BF}"/>
               </a:ext>
             </a:extLst>
           </p:cNvPr>
@@ -822,7 +822,7 @@
           <p:cNvPr id="6" name="Номер слайда 5">
             <a:extLst>
               <a:ext uri="{FF2B5EF4-FFF2-40B4-BE49-F238E27FC236}">
-                <a16:creationId xmlns="" xmlns:a16="http://schemas.microsoft.com/office/drawing/2014/main" id="{5FA045EA-0468-D9FC-49AE-CB25030D4827}"/>
+                <a16:creationId xmlns:a16="http://schemas.microsoft.com/office/drawing/2014/main" xmlns="" id="{5FA045EA-0468-D9FC-49AE-CB25030D4827}"/>
               </a:ext>
             </a:extLst>
           </p:cNvPr>
@@ -881,7 +881,7 @@
           <p:cNvPr id="2" name="Заголовок 1">
             <a:extLst>
               <a:ext uri="{FF2B5EF4-FFF2-40B4-BE49-F238E27FC236}">
-                <a16:creationId xmlns="" xmlns:a16="http://schemas.microsoft.com/office/drawing/2014/main" id="{B7129C76-F162-5C7B-2416-510473405100}"/>
+                <a16:creationId xmlns:a16="http://schemas.microsoft.com/office/drawing/2014/main" xmlns="" id="{B7129C76-F162-5C7B-2416-510473405100}"/>
               </a:ext>
             </a:extLst>
           </p:cNvPr>
@@ -909,7 +909,7 @@
           <p:cNvPr id="3" name="Объект 2">
             <a:extLst>
               <a:ext uri="{FF2B5EF4-FFF2-40B4-BE49-F238E27FC236}">
-                <a16:creationId xmlns="" xmlns:a16="http://schemas.microsoft.com/office/drawing/2014/main" id="{61C4E678-0977-600F-2228-D52F0CF0499E}"/>
+                <a16:creationId xmlns:a16="http://schemas.microsoft.com/office/drawing/2014/main" xmlns="" id="{61C4E678-0977-600F-2228-D52F0CF0499E}"/>
               </a:ext>
             </a:extLst>
           </p:cNvPr>
@@ -966,7 +966,7 @@
           <p:cNvPr id="4" name="Дата 3">
             <a:extLst>
               <a:ext uri="{FF2B5EF4-FFF2-40B4-BE49-F238E27FC236}">
-                <a16:creationId xmlns="" xmlns:a16="http://schemas.microsoft.com/office/drawing/2014/main" id="{9D7BFC9F-5CE6-29DE-2BE8-FC891D575C9F}"/>
+                <a16:creationId xmlns:a16="http://schemas.microsoft.com/office/drawing/2014/main" xmlns="" id="{9D7BFC9F-5CE6-29DE-2BE8-FC891D575C9F}"/>
               </a:ext>
             </a:extLst>
           </p:cNvPr>
@@ -995,7 +995,7 @@
           <p:cNvPr id="5" name="Нижний колонтитул 4">
             <a:extLst>
               <a:ext uri="{FF2B5EF4-FFF2-40B4-BE49-F238E27FC236}">
-                <a16:creationId xmlns="" xmlns:a16="http://schemas.microsoft.com/office/drawing/2014/main" id="{BA3A3FE1-A0A5-A4A2-D027-E22D8815B9A0}"/>
+                <a16:creationId xmlns:a16="http://schemas.microsoft.com/office/drawing/2014/main" xmlns="" id="{BA3A3FE1-A0A5-A4A2-D027-E22D8815B9A0}"/>
               </a:ext>
             </a:extLst>
           </p:cNvPr>
@@ -1020,7 +1020,7 @@
           <p:cNvPr id="6" name="Номер слайда 5">
             <a:extLst>
               <a:ext uri="{FF2B5EF4-FFF2-40B4-BE49-F238E27FC236}">
-                <a16:creationId xmlns="" xmlns:a16="http://schemas.microsoft.com/office/drawing/2014/main" id="{5695A3E3-45AC-12EF-74C6-C1A95D912477}"/>
+                <a16:creationId xmlns:a16="http://schemas.microsoft.com/office/drawing/2014/main" xmlns="" id="{5695A3E3-45AC-12EF-74C6-C1A95D912477}"/>
               </a:ext>
             </a:extLst>
           </p:cNvPr>
@@ -1079,7 +1079,7 @@
           <p:cNvPr id="2" name="Заголовок 1">
             <a:extLst>
               <a:ext uri="{FF2B5EF4-FFF2-40B4-BE49-F238E27FC236}">
-                <a16:creationId xmlns="" xmlns:a16="http://schemas.microsoft.com/office/drawing/2014/main" id="{CF99738D-29D1-1FEE-2F93-494960712647}"/>
+                <a16:creationId xmlns:a16="http://schemas.microsoft.com/office/drawing/2014/main" xmlns="" id="{CF99738D-29D1-1FEE-2F93-494960712647}"/>
               </a:ext>
             </a:extLst>
           </p:cNvPr>
@@ -1116,7 +1116,7 @@
           <p:cNvPr id="3" name="Текст 2">
             <a:extLst>
               <a:ext uri="{FF2B5EF4-FFF2-40B4-BE49-F238E27FC236}">
-                <a16:creationId xmlns="" xmlns:a16="http://schemas.microsoft.com/office/drawing/2014/main" id="{74FFAF06-8F9B-4504-B8CD-1E01DEFFA7CF}"/>
+                <a16:creationId xmlns:a16="http://schemas.microsoft.com/office/drawing/2014/main" xmlns="" id="{74FFAF06-8F9B-4504-B8CD-1E01DEFFA7CF}"/>
               </a:ext>
             </a:extLst>
           </p:cNvPr>
@@ -1241,7 +1241,7 @@
           <p:cNvPr id="4" name="Дата 3">
             <a:extLst>
               <a:ext uri="{FF2B5EF4-FFF2-40B4-BE49-F238E27FC236}">
-                <a16:creationId xmlns="" xmlns:a16="http://schemas.microsoft.com/office/drawing/2014/main" id="{66CAB8DF-18EC-FFE4-A5D5-43D1D379CD0D}"/>
+                <a16:creationId xmlns:a16="http://schemas.microsoft.com/office/drawing/2014/main" xmlns="" id="{66CAB8DF-18EC-FFE4-A5D5-43D1D379CD0D}"/>
               </a:ext>
             </a:extLst>
           </p:cNvPr>
@@ -1270,7 +1270,7 @@
           <p:cNvPr id="5" name="Нижний колонтитул 4">
             <a:extLst>
               <a:ext uri="{FF2B5EF4-FFF2-40B4-BE49-F238E27FC236}">
-                <a16:creationId xmlns="" xmlns:a16="http://schemas.microsoft.com/office/drawing/2014/main" id="{9D2E1C1A-3EF5-3A1E-648F-7836FF26EB92}"/>
+                <a16:creationId xmlns:a16="http://schemas.microsoft.com/office/drawing/2014/main" xmlns="" id="{9D2E1C1A-3EF5-3A1E-648F-7836FF26EB92}"/>
               </a:ext>
             </a:extLst>
           </p:cNvPr>
@@ -1295,7 +1295,7 @@
           <p:cNvPr id="6" name="Номер слайда 5">
             <a:extLst>
               <a:ext uri="{FF2B5EF4-FFF2-40B4-BE49-F238E27FC236}">
-                <a16:creationId xmlns="" xmlns:a16="http://schemas.microsoft.com/office/drawing/2014/main" id="{F45A3AFE-E73F-F029-4666-255CC21DB7C7}"/>
+                <a16:creationId xmlns:a16="http://schemas.microsoft.com/office/drawing/2014/main" xmlns="" id="{F45A3AFE-E73F-F029-4666-255CC21DB7C7}"/>
               </a:ext>
             </a:extLst>
           </p:cNvPr>
@@ -1354,7 +1354,7 @@
           <p:cNvPr id="2" name="Заголовок 1">
             <a:extLst>
               <a:ext uri="{FF2B5EF4-FFF2-40B4-BE49-F238E27FC236}">
-                <a16:creationId xmlns="" xmlns:a16="http://schemas.microsoft.com/office/drawing/2014/main" id="{E788EFDB-F868-D0B9-B602-86395BE56597}"/>
+                <a16:creationId xmlns:a16="http://schemas.microsoft.com/office/drawing/2014/main" xmlns="" id="{E788EFDB-F868-D0B9-B602-86395BE56597}"/>
               </a:ext>
             </a:extLst>
           </p:cNvPr>
@@ -1382,7 +1382,7 @@
           <p:cNvPr id="3" name="Объект 2">
             <a:extLst>
               <a:ext uri="{FF2B5EF4-FFF2-40B4-BE49-F238E27FC236}">
-                <a16:creationId xmlns="" xmlns:a16="http://schemas.microsoft.com/office/drawing/2014/main" id="{F2BFB266-DA77-7CA3-AD26-5154A5C64BCE}"/>
+                <a16:creationId xmlns:a16="http://schemas.microsoft.com/office/drawing/2014/main" xmlns="" id="{F2BFB266-DA77-7CA3-AD26-5154A5C64BCE}"/>
               </a:ext>
             </a:extLst>
           </p:cNvPr>
@@ -1444,7 +1444,7 @@
           <p:cNvPr id="4" name="Объект 3">
             <a:extLst>
               <a:ext uri="{FF2B5EF4-FFF2-40B4-BE49-F238E27FC236}">
-                <a16:creationId xmlns="" xmlns:a16="http://schemas.microsoft.com/office/drawing/2014/main" id="{F1D8EE26-CB8C-1746-62BD-81EA64174D77}"/>
+                <a16:creationId xmlns:a16="http://schemas.microsoft.com/office/drawing/2014/main" xmlns="" id="{F1D8EE26-CB8C-1746-62BD-81EA64174D77}"/>
               </a:ext>
             </a:extLst>
           </p:cNvPr>
@@ -1506,7 +1506,7 @@
           <p:cNvPr id="5" name="Дата 4">
             <a:extLst>
               <a:ext uri="{FF2B5EF4-FFF2-40B4-BE49-F238E27FC236}">
-                <a16:creationId xmlns="" xmlns:a16="http://schemas.microsoft.com/office/drawing/2014/main" id="{11D23A52-BB40-7E96-52C6-49737DCD99D3}"/>
+                <a16:creationId xmlns:a16="http://schemas.microsoft.com/office/drawing/2014/main" xmlns="" id="{11D23A52-BB40-7E96-52C6-49737DCD99D3}"/>
               </a:ext>
             </a:extLst>
           </p:cNvPr>
@@ -1535,7 +1535,7 @@
           <p:cNvPr id="6" name="Нижний колонтитул 5">
             <a:extLst>
               <a:ext uri="{FF2B5EF4-FFF2-40B4-BE49-F238E27FC236}">
-                <a16:creationId xmlns="" xmlns:a16="http://schemas.microsoft.com/office/drawing/2014/main" id="{19B4582A-417C-A911-B74F-DD7B4ACF07D2}"/>
+                <a16:creationId xmlns:a16="http://schemas.microsoft.com/office/drawing/2014/main" xmlns="" id="{19B4582A-417C-A911-B74F-DD7B4ACF07D2}"/>
               </a:ext>
             </a:extLst>
           </p:cNvPr>
@@ -1560,7 +1560,7 @@
           <p:cNvPr id="7" name="Номер слайда 6">
             <a:extLst>
               <a:ext uri="{FF2B5EF4-FFF2-40B4-BE49-F238E27FC236}">
-                <a16:creationId xmlns="" xmlns:a16="http://schemas.microsoft.com/office/drawing/2014/main" id="{74F4F6C6-35C4-BAA8-315D-707AFA77EC84}"/>
+                <a16:creationId xmlns:a16="http://schemas.microsoft.com/office/drawing/2014/main" xmlns="" id="{74F4F6C6-35C4-BAA8-315D-707AFA77EC84}"/>
               </a:ext>
             </a:extLst>
           </p:cNvPr>
@@ -1619,7 +1619,7 @@
           <p:cNvPr id="2" name="Заголовок 1">
             <a:extLst>
               <a:ext uri="{FF2B5EF4-FFF2-40B4-BE49-F238E27FC236}">
-                <a16:creationId xmlns="" xmlns:a16="http://schemas.microsoft.com/office/drawing/2014/main" id="{74AAC9BE-5722-2CEF-E543-A802AE8C1CE9}"/>
+                <a16:creationId xmlns:a16="http://schemas.microsoft.com/office/drawing/2014/main" xmlns="" id="{74AAC9BE-5722-2CEF-E543-A802AE8C1CE9}"/>
               </a:ext>
             </a:extLst>
           </p:cNvPr>
@@ -1652,7 +1652,7 @@
           <p:cNvPr id="3" name="Текст 2">
             <a:extLst>
               <a:ext uri="{FF2B5EF4-FFF2-40B4-BE49-F238E27FC236}">
-                <a16:creationId xmlns="" xmlns:a16="http://schemas.microsoft.com/office/drawing/2014/main" id="{2EDFE847-E820-D8BE-0F7B-0CA38514F066}"/>
+                <a16:creationId xmlns:a16="http://schemas.microsoft.com/office/drawing/2014/main" xmlns="" id="{2EDFE847-E820-D8BE-0F7B-0CA38514F066}"/>
               </a:ext>
             </a:extLst>
           </p:cNvPr>
@@ -1723,7 +1723,7 @@
           <p:cNvPr id="4" name="Объект 3">
             <a:extLst>
               <a:ext uri="{FF2B5EF4-FFF2-40B4-BE49-F238E27FC236}">
-                <a16:creationId xmlns="" xmlns:a16="http://schemas.microsoft.com/office/drawing/2014/main" id="{8A7393C9-E3DC-CA8D-D540-0353DB23B3A4}"/>
+                <a16:creationId xmlns:a16="http://schemas.microsoft.com/office/drawing/2014/main" xmlns="" id="{8A7393C9-E3DC-CA8D-D540-0353DB23B3A4}"/>
               </a:ext>
             </a:extLst>
           </p:cNvPr>
@@ -1785,7 +1785,7 @@
           <p:cNvPr id="5" name="Текст 4">
             <a:extLst>
               <a:ext uri="{FF2B5EF4-FFF2-40B4-BE49-F238E27FC236}">
-                <a16:creationId xmlns="" xmlns:a16="http://schemas.microsoft.com/office/drawing/2014/main" id="{1974D705-0893-1BA2-77A9-D52BB9EEDA89}"/>
+                <a16:creationId xmlns:a16="http://schemas.microsoft.com/office/drawing/2014/main" xmlns="" id="{1974D705-0893-1BA2-77A9-D52BB9EEDA89}"/>
               </a:ext>
             </a:extLst>
           </p:cNvPr>
@@ -1856,7 +1856,7 @@
           <p:cNvPr id="6" name="Объект 5">
             <a:extLst>
               <a:ext uri="{FF2B5EF4-FFF2-40B4-BE49-F238E27FC236}">
-                <a16:creationId xmlns="" xmlns:a16="http://schemas.microsoft.com/office/drawing/2014/main" id="{E7A37E30-5700-5F01-1190-E3E3F2046A6E}"/>
+                <a16:creationId xmlns:a16="http://schemas.microsoft.com/office/drawing/2014/main" xmlns="" id="{E7A37E30-5700-5F01-1190-E3E3F2046A6E}"/>
               </a:ext>
             </a:extLst>
           </p:cNvPr>
@@ -1918,7 +1918,7 @@
           <p:cNvPr id="7" name="Дата 6">
             <a:extLst>
               <a:ext uri="{FF2B5EF4-FFF2-40B4-BE49-F238E27FC236}">
-                <a16:creationId xmlns="" xmlns:a16="http://schemas.microsoft.com/office/drawing/2014/main" id="{6A726601-0A05-1156-4B00-E5145886BB12}"/>
+                <a16:creationId xmlns:a16="http://schemas.microsoft.com/office/drawing/2014/main" xmlns="" id="{6A726601-0A05-1156-4B00-E5145886BB12}"/>
               </a:ext>
             </a:extLst>
           </p:cNvPr>
@@ -1947,7 +1947,7 @@
           <p:cNvPr id="8" name="Нижний колонтитул 7">
             <a:extLst>
               <a:ext uri="{FF2B5EF4-FFF2-40B4-BE49-F238E27FC236}">
-                <a16:creationId xmlns="" xmlns:a16="http://schemas.microsoft.com/office/drawing/2014/main" id="{B3DD2024-93CA-CB32-50CD-2EE0D48A376B}"/>
+                <a16:creationId xmlns:a16="http://schemas.microsoft.com/office/drawing/2014/main" xmlns="" id="{B3DD2024-93CA-CB32-50CD-2EE0D48A376B}"/>
               </a:ext>
             </a:extLst>
           </p:cNvPr>
@@ -1972,7 +1972,7 @@
           <p:cNvPr id="9" name="Номер слайда 8">
             <a:extLst>
               <a:ext uri="{FF2B5EF4-FFF2-40B4-BE49-F238E27FC236}">
-                <a16:creationId xmlns="" xmlns:a16="http://schemas.microsoft.com/office/drawing/2014/main" id="{D8ED871C-328D-CC15-7341-27C9B94A1690}"/>
+                <a16:creationId xmlns:a16="http://schemas.microsoft.com/office/drawing/2014/main" xmlns="" id="{D8ED871C-328D-CC15-7341-27C9B94A1690}"/>
               </a:ext>
             </a:extLst>
           </p:cNvPr>
@@ -2031,7 +2031,7 @@
           <p:cNvPr id="2" name="Заголовок 1">
             <a:extLst>
               <a:ext uri="{FF2B5EF4-FFF2-40B4-BE49-F238E27FC236}">
-                <a16:creationId xmlns="" xmlns:a16="http://schemas.microsoft.com/office/drawing/2014/main" id="{075F7F63-E394-4EEA-6325-053D13B4935C}"/>
+                <a16:creationId xmlns:a16="http://schemas.microsoft.com/office/drawing/2014/main" xmlns="" id="{075F7F63-E394-4EEA-6325-053D13B4935C}"/>
               </a:ext>
             </a:extLst>
           </p:cNvPr>
@@ -2059,7 +2059,7 @@
           <p:cNvPr id="3" name="Дата 2">
             <a:extLst>
               <a:ext uri="{FF2B5EF4-FFF2-40B4-BE49-F238E27FC236}">
-                <a16:creationId xmlns="" xmlns:a16="http://schemas.microsoft.com/office/drawing/2014/main" id="{3DDAD4B2-35B5-D46A-F2D4-281C4A2B8713}"/>
+                <a16:creationId xmlns:a16="http://schemas.microsoft.com/office/drawing/2014/main" xmlns="" id="{3DDAD4B2-35B5-D46A-F2D4-281C4A2B8713}"/>
               </a:ext>
             </a:extLst>
           </p:cNvPr>
@@ -2088,7 +2088,7 @@
           <p:cNvPr id="4" name="Нижний колонтитул 3">
             <a:extLst>
               <a:ext uri="{FF2B5EF4-FFF2-40B4-BE49-F238E27FC236}">
-                <a16:creationId xmlns="" xmlns:a16="http://schemas.microsoft.com/office/drawing/2014/main" id="{5DC804B2-E6E2-A5DE-6548-203149FBC493}"/>
+                <a16:creationId xmlns:a16="http://schemas.microsoft.com/office/drawing/2014/main" xmlns="" id="{5DC804B2-E6E2-A5DE-6548-203149FBC493}"/>
               </a:ext>
             </a:extLst>
           </p:cNvPr>
@@ -2113,7 +2113,7 @@
           <p:cNvPr id="5" name="Номер слайда 4">
             <a:extLst>
               <a:ext uri="{FF2B5EF4-FFF2-40B4-BE49-F238E27FC236}">
-                <a16:creationId xmlns="" xmlns:a16="http://schemas.microsoft.com/office/drawing/2014/main" id="{76B480FC-46A2-6D54-4FFA-EC262896CEF1}"/>
+                <a16:creationId xmlns:a16="http://schemas.microsoft.com/office/drawing/2014/main" xmlns="" id="{76B480FC-46A2-6D54-4FFA-EC262896CEF1}"/>
               </a:ext>
             </a:extLst>
           </p:cNvPr>
@@ -2172,7 +2172,7 @@
           <p:cNvPr id="2" name="Дата 1">
             <a:extLst>
               <a:ext uri="{FF2B5EF4-FFF2-40B4-BE49-F238E27FC236}">
-                <a16:creationId xmlns="" xmlns:a16="http://schemas.microsoft.com/office/drawing/2014/main" id="{489E4C9F-6A30-FCAB-9868-CB5413C9EFA9}"/>
+                <a16:creationId xmlns:a16="http://schemas.microsoft.com/office/drawing/2014/main" xmlns="" id="{489E4C9F-6A30-FCAB-9868-CB5413C9EFA9}"/>
               </a:ext>
             </a:extLst>
           </p:cNvPr>
@@ -2201,7 +2201,7 @@
           <p:cNvPr id="3" name="Нижний колонтитул 2">
             <a:extLst>
               <a:ext uri="{FF2B5EF4-FFF2-40B4-BE49-F238E27FC236}">
-                <a16:creationId xmlns="" xmlns:a16="http://schemas.microsoft.com/office/drawing/2014/main" id="{FD3CED7A-C697-7E32-1CD5-D39C1621917B}"/>
+                <a16:creationId xmlns:a16="http://schemas.microsoft.com/office/drawing/2014/main" xmlns="" id="{FD3CED7A-C697-7E32-1CD5-D39C1621917B}"/>
               </a:ext>
             </a:extLst>
           </p:cNvPr>
@@ -2226,7 +2226,7 @@
           <p:cNvPr id="4" name="Номер слайда 3">
             <a:extLst>
               <a:ext uri="{FF2B5EF4-FFF2-40B4-BE49-F238E27FC236}">
-                <a16:creationId xmlns="" xmlns:a16="http://schemas.microsoft.com/office/drawing/2014/main" id="{2CDF508F-2617-5958-3E61-003D2C7D89E5}"/>
+                <a16:creationId xmlns:a16="http://schemas.microsoft.com/office/drawing/2014/main" xmlns="" id="{2CDF508F-2617-5958-3E61-003D2C7D89E5}"/>
               </a:ext>
             </a:extLst>
           </p:cNvPr>
@@ -2285,7 +2285,7 @@
           <p:cNvPr id="2" name="Заголовок 1">
             <a:extLst>
               <a:ext uri="{FF2B5EF4-FFF2-40B4-BE49-F238E27FC236}">
-                <a16:creationId xmlns="" xmlns:a16="http://schemas.microsoft.com/office/drawing/2014/main" id="{FEE3F87C-33B1-69A7-EBC4-E87834B0C11E}"/>
+                <a16:creationId xmlns:a16="http://schemas.microsoft.com/office/drawing/2014/main" xmlns="" id="{FEE3F87C-33B1-69A7-EBC4-E87834B0C11E}"/>
               </a:ext>
             </a:extLst>
           </p:cNvPr>
@@ -2322,7 +2322,7 @@
           <p:cNvPr id="3" name="Объект 2">
             <a:extLst>
               <a:ext uri="{FF2B5EF4-FFF2-40B4-BE49-F238E27FC236}">
-                <a16:creationId xmlns="" xmlns:a16="http://schemas.microsoft.com/office/drawing/2014/main" id="{C9F28E09-F043-CD61-E673-5382840E3A0A}"/>
+                <a16:creationId xmlns:a16="http://schemas.microsoft.com/office/drawing/2014/main" xmlns="" id="{C9F28E09-F043-CD61-E673-5382840E3A0A}"/>
               </a:ext>
             </a:extLst>
           </p:cNvPr>
@@ -2412,7 +2412,7 @@
           <p:cNvPr id="4" name="Текст 3">
             <a:extLst>
               <a:ext uri="{FF2B5EF4-FFF2-40B4-BE49-F238E27FC236}">
-                <a16:creationId xmlns="" xmlns:a16="http://schemas.microsoft.com/office/drawing/2014/main" id="{90C742E4-5A7B-7BEC-1EF1-093DC7EBCE34}"/>
+                <a16:creationId xmlns:a16="http://schemas.microsoft.com/office/drawing/2014/main" xmlns="" id="{90C742E4-5A7B-7BEC-1EF1-093DC7EBCE34}"/>
               </a:ext>
             </a:extLst>
           </p:cNvPr>
@@ -2483,7 +2483,7 @@
           <p:cNvPr id="5" name="Дата 4">
             <a:extLst>
               <a:ext uri="{FF2B5EF4-FFF2-40B4-BE49-F238E27FC236}">
-                <a16:creationId xmlns="" xmlns:a16="http://schemas.microsoft.com/office/drawing/2014/main" id="{AE95330A-7EA5-9251-51DC-A13F4BFD830B}"/>
+                <a16:creationId xmlns:a16="http://schemas.microsoft.com/office/drawing/2014/main" xmlns="" id="{AE95330A-7EA5-9251-51DC-A13F4BFD830B}"/>
               </a:ext>
             </a:extLst>
           </p:cNvPr>
@@ -2512,7 +2512,7 @@
           <p:cNvPr id="6" name="Нижний колонтитул 5">
             <a:extLst>
               <a:ext uri="{FF2B5EF4-FFF2-40B4-BE49-F238E27FC236}">
-                <a16:creationId xmlns="" xmlns:a16="http://schemas.microsoft.com/office/drawing/2014/main" id="{82428EA5-6431-647A-65EA-8150C9F09445}"/>
+                <a16:creationId xmlns:a16="http://schemas.microsoft.com/office/drawing/2014/main" xmlns="" id="{82428EA5-6431-647A-65EA-8150C9F09445}"/>
               </a:ext>
             </a:extLst>
           </p:cNvPr>
@@ -2537,7 +2537,7 @@
           <p:cNvPr id="7" name="Номер слайда 6">
             <a:extLst>
               <a:ext uri="{FF2B5EF4-FFF2-40B4-BE49-F238E27FC236}">
-                <a16:creationId xmlns="" xmlns:a16="http://schemas.microsoft.com/office/drawing/2014/main" id="{ACC0D417-00AC-ADF1-E9D8-3F0BEAB8ED1D}"/>
+                <a16:creationId xmlns:a16="http://schemas.microsoft.com/office/drawing/2014/main" xmlns="" id="{ACC0D417-00AC-ADF1-E9D8-3F0BEAB8ED1D}"/>
               </a:ext>
             </a:extLst>
           </p:cNvPr>
@@ -2596,7 +2596,7 @@
           <p:cNvPr id="2" name="Заголовок 1">
             <a:extLst>
               <a:ext uri="{FF2B5EF4-FFF2-40B4-BE49-F238E27FC236}">
-                <a16:creationId xmlns="" xmlns:a16="http://schemas.microsoft.com/office/drawing/2014/main" id="{740B8F67-41A5-EFB3-256B-3B99286B6D5E}"/>
+                <a16:creationId xmlns:a16="http://schemas.microsoft.com/office/drawing/2014/main" xmlns="" id="{740B8F67-41A5-EFB3-256B-3B99286B6D5E}"/>
               </a:ext>
             </a:extLst>
           </p:cNvPr>
@@ -2633,7 +2633,7 @@
           <p:cNvPr id="3" name="Рисунок 2">
             <a:extLst>
               <a:ext uri="{FF2B5EF4-FFF2-40B4-BE49-F238E27FC236}">
-                <a16:creationId xmlns="" xmlns:a16="http://schemas.microsoft.com/office/drawing/2014/main" id="{1C5FF903-DC72-F32B-53DF-6DB4384996C3}"/>
+                <a16:creationId xmlns:a16="http://schemas.microsoft.com/office/drawing/2014/main" xmlns="" id="{1C5FF903-DC72-F32B-53DF-6DB4384996C3}"/>
               </a:ext>
             </a:extLst>
           </p:cNvPr>
@@ -2700,7 +2700,7 @@
           <p:cNvPr id="4" name="Текст 3">
             <a:extLst>
               <a:ext uri="{FF2B5EF4-FFF2-40B4-BE49-F238E27FC236}">
-                <a16:creationId xmlns="" xmlns:a16="http://schemas.microsoft.com/office/drawing/2014/main" id="{804D4318-C40A-7266-84A2-3A9436E93B08}"/>
+                <a16:creationId xmlns:a16="http://schemas.microsoft.com/office/drawing/2014/main" xmlns="" id="{804D4318-C40A-7266-84A2-3A9436E93B08}"/>
               </a:ext>
             </a:extLst>
           </p:cNvPr>
@@ -2771,7 +2771,7 @@
           <p:cNvPr id="5" name="Дата 4">
             <a:extLst>
               <a:ext uri="{FF2B5EF4-FFF2-40B4-BE49-F238E27FC236}">
-                <a16:creationId xmlns="" xmlns:a16="http://schemas.microsoft.com/office/drawing/2014/main" id="{B0041109-53BA-3D3F-766D-65E466E8C2C6}"/>
+                <a16:creationId xmlns:a16="http://schemas.microsoft.com/office/drawing/2014/main" xmlns="" id="{B0041109-53BA-3D3F-766D-65E466E8C2C6}"/>
               </a:ext>
             </a:extLst>
           </p:cNvPr>
@@ -2800,7 +2800,7 @@
           <p:cNvPr id="6" name="Нижний колонтитул 5">
             <a:extLst>
               <a:ext uri="{FF2B5EF4-FFF2-40B4-BE49-F238E27FC236}">
-                <a16:creationId xmlns="" xmlns:a16="http://schemas.microsoft.com/office/drawing/2014/main" id="{F36483D2-6B7D-9F21-DBF3-CB88DF9296E8}"/>
+                <a16:creationId xmlns:a16="http://schemas.microsoft.com/office/drawing/2014/main" xmlns="" id="{F36483D2-6B7D-9F21-DBF3-CB88DF9296E8}"/>
               </a:ext>
             </a:extLst>
           </p:cNvPr>
@@ -2825,7 +2825,7 @@
           <p:cNvPr id="7" name="Номер слайда 6">
             <a:extLst>
               <a:ext uri="{FF2B5EF4-FFF2-40B4-BE49-F238E27FC236}">
-                <a16:creationId xmlns="" xmlns:a16="http://schemas.microsoft.com/office/drawing/2014/main" id="{61FA85C4-ADFD-94C0-FE3C-710E6930221E}"/>
+                <a16:creationId xmlns:a16="http://schemas.microsoft.com/office/drawing/2014/main" xmlns="" id="{61FA85C4-ADFD-94C0-FE3C-710E6930221E}"/>
               </a:ext>
             </a:extLst>
           </p:cNvPr>
@@ -2889,7 +2889,7 @@
           <p:cNvPr id="2" name="Заголовок 1">
             <a:extLst>
               <a:ext uri="{FF2B5EF4-FFF2-40B4-BE49-F238E27FC236}">
-                <a16:creationId xmlns="" xmlns:a16="http://schemas.microsoft.com/office/drawing/2014/main" id="{A6C9F4F8-6802-3B04-B0B7-B8A75EDD0386}"/>
+                <a16:creationId xmlns:a16="http://schemas.microsoft.com/office/drawing/2014/main" xmlns="" id="{A6C9F4F8-6802-3B04-B0B7-B8A75EDD0386}"/>
               </a:ext>
             </a:extLst>
           </p:cNvPr>
@@ -2927,7 +2927,7 @@
           <p:cNvPr id="3" name="Текст 2">
             <a:extLst>
               <a:ext uri="{FF2B5EF4-FFF2-40B4-BE49-F238E27FC236}">
-                <a16:creationId xmlns="" xmlns:a16="http://schemas.microsoft.com/office/drawing/2014/main" id="{405F4598-BD95-AD3A-A95E-4D3B8864C66F}"/>
+                <a16:creationId xmlns:a16="http://schemas.microsoft.com/office/drawing/2014/main" xmlns="" id="{405F4598-BD95-AD3A-A95E-4D3B8864C66F}"/>
               </a:ext>
             </a:extLst>
           </p:cNvPr>
@@ -2994,7 +2994,7 @@
           <p:cNvPr id="4" name="Дата 3">
             <a:extLst>
               <a:ext uri="{FF2B5EF4-FFF2-40B4-BE49-F238E27FC236}">
-                <a16:creationId xmlns="" xmlns:a16="http://schemas.microsoft.com/office/drawing/2014/main" id="{AEDB7EB0-D0E2-5D1C-B622-10895074B18C}"/>
+                <a16:creationId xmlns:a16="http://schemas.microsoft.com/office/drawing/2014/main" xmlns="" id="{AEDB7EB0-D0E2-5D1C-B622-10895074B18C}"/>
               </a:ext>
             </a:extLst>
           </p:cNvPr>
@@ -3041,7 +3041,7 @@
           <p:cNvPr id="5" name="Нижний колонтитул 4">
             <a:extLst>
               <a:ext uri="{FF2B5EF4-FFF2-40B4-BE49-F238E27FC236}">
-                <a16:creationId xmlns="" xmlns:a16="http://schemas.microsoft.com/office/drawing/2014/main" id="{059D35F3-99B2-6A41-C87E-923937F89B6A}"/>
+                <a16:creationId xmlns:a16="http://schemas.microsoft.com/office/drawing/2014/main" xmlns="" id="{059D35F3-99B2-6A41-C87E-923937F89B6A}"/>
               </a:ext>
             </a:extLst>
           </p:cNvPr>
@@ -3084,7 +3084,7 @@
           <p:cNvPr id="6" name="Номер слайда 5">
             <a:extLst>
               <a:ext uri="{FF2B5EF4-FFF2-40B4-BE49-F238E27FC236}">
-                <a16:creationId xmlns="" xmlns:a16="http://schemas.microsoft.com/office/drawing/2014/main" id="{CBBE53B6-7736-01FF-16C6-FF751C10B948}"/>
+                <a16:creationId xmlns:a16="http://schemas.microsoft.com/office/drawing/2014/main" xmlns="" id="{CBBE53B6-7736-01FF-16C6-FF751C10B948}"/>
               </a:ext>
             </a:extLst>
           </p:cNvPr>
@@ -3452,7 +3452,7 @@
           <p:cNvPr id="2" name="Рисунок 1">
             <a:extLst>
               <a:ext uri="{FF2B5EF4-FFF2-40B4-BE49-F238E27FC236}">
-                <a16:creationId xmlns="" xmlns:a16="http://schemas.microsoft.com/office/drawing/2014/main" id="{81732F0E-C39A-4FEC-A358-9F14DA5C1D9C}"/>
+                <a16:creationId xmlns:a16="http://schemas.microsoft.com/office/drawing/2014/main" xmlns="" id="{81732F0E-C39A-4FEC-A358-9F14DA5C1D9C}"/>
               </a:ext>
             </a:extLst>
           </p:cNvPr>
@@ -3705,6 +3705,13 @@
   <p:clrMapOvr>
     <a:masterClrMapping/>
   </p:clrMapOvr>
+  <p:timing>
+    <p:tnLst>
+      <p:par>
+        <p:cTn id="1" dur="indefinite" restart="never" nodeType="tmRoot"/>
+      </p:par>
+    </p:tnLst>
+  </p:timing>
 </p:sld>
 </file>
 
@@ -3730,7 +3737,7 @@
           <p:cNvPr id="2" name="Рисунок 1">
             <a:extLst>
               <a:ext uri="{FF2B5EF4-FFF2-40B4-BE49-F238E27FC236}">
-                <a16:creationId xmlns="" xmlns:a16="http://schemas.microsoft.com/office/drawing/2014/main" id="{81732F0E-C39A-4FEC-A358-9F14DA5C1D9C}"/>
+                <a16:creationId xmlns:a16="http://schemas.microsoft.com/office/drawing/2014/main" xmlns="" id="{81732F0E-C39A-4FEC-A358-9F14DA5C1D9C}"/>
               </a:ext>
             </a:extLst>
           </p:cNvPr>
@@ -3771,6 +3778,13 @@
   <p:clrMapOvr>
     <a:masterClrMapping/>
   </p:clrMapOvr>
+  <p:timing>
+    <p:tnLst>
+      <p:par>
+        <p:cTn id="1" dur="indefinite" restart="never" nodeType="tmRoot"/>
+      </p:par>
+    </p:tnLst>
+  </p:timing>
 </p:sld>
 </file>
 
@@ -3796,7 +3810,7 @@
           <p:cNvPr id="11" name="Рисунок 10">
             <a:extLst>
               <a:ext uri="{FF2B5EF4-FFF2-40B4-BE49-F238E27FC236}">
-                <a16:creationId xmlns="" xmlns:a16="http://schemas.microsoft.com/office/drawing/2014/main" id="{81732F0E-C39A-4FEC-A358-9F14DA5C1D9C}"/>
+                <a16:creationId xmlns:a16="http://schemas.microsoft.com/office/drawing/2014/main" xmlns="" id="{81732F0E-C39A-4FEC-A358-9F14DA5C1D9C}"/>
               </a:ext>
             </a:extLst>
           </p:cNvPr>
@@ -3832,7 +3846,7 @@
           <p:cNvPr id="5" name="TextBox 4">
             <a:extLst>
               <a:ext uri="{FF2B5EF4-FFF2-40B4-BE49-F238E27FC236}">
-                <a16:creationId xmlns="" xmlns:a16="http://schemas.microsoft.com/office/drawing/2014/main" id="{4BDB5CA0-74C3-0344-C84A-C071FD515C7F}"/>
+                <a16:creationId xmlns:a16="http://schemas.microsoft.com/office/drawing/2014/main" xmlns="" id="{4BDB5CA0-74C3-0344-C84A-C071FD515C7F}"/>
               </a:ext>
             </a:extLst>
           </p:cNvPr>
@@ -3874,7 +3888,7 @@
           <p:cNvPr id="6" name="TextBox 5">
             <a:extLst>
               <a:ext uri="{FF2B5EF4-FFF2-40B4-BE49-F238E27FC236}">
-                <a16:creationId xmlns="" xmlns:a16="http://schemas.microsoft.com/office/drawing/2014/main" id="{672C9DD3-D05E-13A3-20F4-6742F570D67C}"/>
+                <a16:creationId xmlns:a16="http://schemas.microsoft.com/office/drawing/2014/main" xmlns="" id="{672C9DD3-D05E-13A3-20F4-6742F570D67C}"/>
               </a:ext>
             </a:extLst>
           </p:cNvPr>
@@ -3912,7 +3926,7 @@
           <p:cNvPr id="7" name="TextBox 6">
             <a:extLst>
               <a:ext uri="{FF2B5EF4-FFF2-40B4-BE49-F238E27FC236}">
-                <a16:creationId xmlns="" xmlns:a16="http://schemas.microsoft.com/office/drawing/2014/main" id="{C793D0E5-EE2C-B134-711E-D19E25B98D91}"/>
+                <a16:creationId xmlns:a16="http://schemas.microsoft.com/office/drawing/2014/main" xmlns="" id="{C793D0E5-EE2C-B134-711E-D19E25B98D91}"/>
               </a:ext>
             </a:extLst>
           </p:cNvPr>
@@ -4107,6 +4121,13 @@
   <p:clrMapOvr>
     <a:masterClrMapping/>
   </p:clrMapOvr>
+  <p:timing>
+    <p:tnLst>
+      <p:par>
+        <p:cTn id="1" dur="indefinite" restart="never" nodeType="tmRoot"/>
+      </p:par>
+    </p:tnLst>
+  </p:timing>
 </p:sld>
 </file>
 
@@ -4132,7 +4153,7 @@
           <p:cNvPr id="3" name="Рисунок 2">
             <a:extLst>
               <a:ext uri="{FF2B5EF4-FFF2-40B4-BE49-F238E27FC236}">
-                <a16:creationId xmlns="" xmlns:a16="http://schemas.microsoft.com/office/drawing/2014/main" id="{FE799D53-F507-92AA-AB73-C0E777DEE0C3}"/>
+                <a16:creationId xmlns:a16="http://schemas.microsoft.com/office/drawing/2014/main" xmlns="" id="{FE799D53-F507-92AA-AB73-C0E777DEE0C3}"/>
               </a:ext>
             </a:extLst>
           </p:cNvPr>
@@ -4168,7 +4189,7 @@
           <p:cNvPr id="2" name="TextBox 1">
             <a:extLst>
               <a:ext uri="{FF2B5EF4-FFF2-40B4-BE49-F238E27FC236}">
-                <a16:creationId xmlns="" xmlns:a16="http://schemas.microsoft.com/office/drawing/2014/main" id="{35A77569-4B1F-FAC1-3FBB-AC56FC35CAAD}"/>
+                <a16:creationId xmlns:a16="http://schemas.microsoft.com/office/drawing/2014/main" xmlns="" id="{35A77569-4B1F-FAC1-3FBB-AC56FC35CAAD}"/>
               </a:ext>
             </a:extLst>
           </p:cNvPr>
@@ -4211,7 +4232,7 @@
           <p:cNvPr id="6" name="TextBox 5">
             <a:extLst>
               <a:ext uri="{FF2B5EF4-FFF2-40B4-BE49-F238E27FC236}">
-                <a16:creationId xmlns="" xmlns:a16="http://schemas.microsoft.com/office/drawing/2014/main" id="{F8C9BC09-48E8-F9E0-56AA-355E5D5B410D}"/>
+                <a16:creationId xmlns:a16="http://schemas.microsoft.com/office/drawing/2014/main" xmlns="" id="{F8C9BC09-48E8-F9E0-56AA-355E5D5B410D}"/>
               </a:ext>
             </a:extLst>
           </p:cNvPr>
@@ -5181,6 +5202,13 @@
   <p:clrMapOvr>
     <a:masterClrMapping/>
   </p:clrMapOvr>
+  <p:timing>
+    <p:tnLst>
+      <p:par>
+        <p:cTn id="1" dur="indefinite" restart="never" nodeType="tmRoot"/>
+      </p:par>
+    </p:tnLst>
+  </p:timing>
 </p:sld>
 </file>
 
@@ -5206,7 +5234,7 @@
           <p:cNvPr id="3" name="Рисунок 2">
             <a:extLst>
               <a:ext uri="{FF2B5EF4-FFF2-40B4-BE49-F238E27FC236}">
-                <a16:creationId xmlns="" xmlns:a16="http://schemas.microsoft.com/office/drawing/2014/main" id="{BECABDF3-E0B9-1ACE-0940-95DBB9EB6DC8}"/>
+                <a16:creationId xmlns:a16="http://schemas.microsoft.com/office/drawing/2014/main" xmlns="" id="{BECABDF3-E0B9-1ACE-0940-95DBB9EB6DC8}"/>
               </a:ext>
             </a:extLst>
           </p:cNvPr>
@@ -5242,7 +5270,7 @@
           <p:cNvPr id="2" name="TextBox 1">
             <a:extLst>
               <a:ext uri="{FF2B5EF4-FFF2-40B4-BE49-F238E27FC236}">
-                <a16:creationId xmlns="" xmlns:a16="http://schemas.microsoft.com/office/drawing/2014/main" id="{08810D0D-94CA-BA31-2665-7888352D0C02}"/>
+                <a16:creationId xmlns:a16="http://schemas.microsoft.com/office/drawing/2014/main" xmlns="" id="{08810D0D-94CA-BA31-2665-7888352D0C02}"/>
               </a:ext>
             </a:extLst>
           </p:cNvPr>
@@ -5420,6 +5448,13 @@
   <p:clrMapOvr>
     <a:masterClrMapping/>
   </p:clrMapOvr>
+  <p:timing>
+    <p:tnLst>
+      <p:par>
+        <p:cTn id="1" dur="indefinite" restart="never" nodeType="tmRoot"/>
+      </p:par>
+    </p:tnLst>
+  </p:timing>
 </p:sld>
 </file>
 
@@ -5445,7 +5480,7 @@
           <p:cNvPr id="3" name="Рисунок 2">
             <a:extLst>
               <a:ext uri="{FF2B5EF4-FFF2-40B4-BE49-F238E27FC236}">
-                <a16:creationId xmlns="" xmlns:a16="http://schemas.microsoft.com/office/drawing/2014/main" id="{BECABDF3-E0B9-1ACE-0940-95DBB9EB6DC8}"/>
+                <a16:creationId xmlns:a16="http://schemas.microsoft.com/office/drawing/2014/main" xmlns="" id="{BECABDF3-E0B9-1ACE-0940-95DBB9EB6DC8}"/>
               </a:ext>
             </a:extLst>
           </p:cNvPr>
@@ -5481,7 +5516,7 @@
           <p:cNvPr id="2" name="TextBox 1">
             <a:extLst>
               <a:ext uri="{FF2B5EF4-FFF2-40B4-BE49-F238E27FC236}">
-                <a16:creationId xmlns="" xmlns:a16="http://schemas.microsoft.com/office/drawing/2014/main" id="{08810D0D-94CA-BA31-2665-7888352D0C02}"/>
+                <a16:creationId xmlns:a16="http://schemas.microsoft.com/office/drawing/2014/main" xmlns="" id="{08810D0D-94CA-BA31-2665-7888352D0C02}"/>
               </a:ext>
             </a:extLst>
           </p:cNvPr>
@@ -5671,6 +5706,13 @@
   <p:clrMapOvr>
     <a:masterClrMapping/>
   </p:clrMapOvr>
+  <p:timing>
+    <p:tnLst>
+      <p:par>
+        <p:cTn id="1" dur="indefinite" restart="never" nodeType="tmRoot"/>
+      </p:par>
+    </p:tnLst>
+  </p:timing>
 </p:sld>
 </file>
 
@@ -5696,7 +5738,7 @@
           <p:cNvPr id="3" name="Рисунок 2">
             <a:extLst>
               <a:ext uri="{FF2B5EF4-FFF2-40B4-BE49-F238E27FC236}">
-                <a16:creationId xmlns="" xmlns:a16="http://schemas.microsoft.com/office/drawing/2014/main" id="{BECABDF3-E0B9-1ACE-0940-95DBB9EB6DC8}"/>
+                <a16:creationId xmlns:a16="http://schemas.microsoft.com/office/drawing/2014/main" xmlns="" id="{BECABDF3-E0B9-1ACE-0940-95DBB9EB6DC8}"/>
               </a:ext>
             </a:extLst>
           </p:cNvPr>
@@ -5732,7 +5774,7 @@
           <p:cNvPr id="2" name="TextBox 1">
             <a:extLst>
               <a:ext uri="{FF2B5EF4-FFF2-40B4-BE49-F238E27FC236}">
-                <a16:creationId xmlns="" xmlns:a16="http://schemas.microsoft.com/office/drawing/2014/main" id="{08810D0D-94CA-BA31-2665-7888352D0C02}"/>
+                <a16:creationId xmlns:a16="http://schemas.microsoft.com/office/drawing/2014/main" xmlns="" id="{08810D0D-94CA-BA31-2665-7888352D0C02}"/>
               </a:ext>
             </a:extLst>
           </p:cNvPr>
@@ -5903,6 +5945,13 @@
   <p:clrMapOvr>
     <a:masterClrMapping/>
   </p:clrMapOvr>
+  <p:timing>
+    <p:tnLst>
+      <p:par>
+        <p:cTn id="1" dur="indefinite" restart="never" nodeType="tmRoot"/>
+      </p:par>
+    </p:tnLst>
+  </p:timing>
 </p:sld>
 </file>
 
@@ -5928,7 +5977,7 @@
           <p:cNvPr id="3" name="Рисунок 2">
             <a:extLst>
               <a:ext uri="{FF2B5EF4-FFF2-40B4-BE49-F238E27FC236}">
-                <a16:creationId xmlns="" xmlns:a16="http://schemas.microsoft.com/office/drawing/2014/main" id="{F759EEF5-2B7D-CC05-9E12-01D69C20784B}"/>
+                <a16:creationId xmlns:a16="http://schemas.microsoft.com/office/drawing/2014/main" xmlns="" id="{F759EEF5-2B7D-CC05-9E12-01D69C20784B}"/>
               </a:ext>
             </a:extLst>
           </p:cNvPr>
@@ -5964,7 +6013,7 @@
           <p:cNvPr id="2" name="TextBox 1">
             <a:extLst>
               <a:ext uri="{FF2B5EF4-FFF2-40B4-BE49-F238E27FC236}">
-                <a16:creationId xmlns="" xmlns:a16="http://schemas.microsoft.com/office/drawing/2014/main" id="{08810D0D-94CA-BA31-2665-7888352D0C02}"/>
+                <a16:creationId xmlns:a16="http://schemas.microsoft.com/office/drawing/2014/main" xmlns="" id="{08810D0D-94CA-BA31-2665-7888352D0C02}"/>
               </a:ext>
             </a:extLst>
           </p:cNvPr>
@@ -6215,6 +6264,13 @@
   <p:clrMapOvr>
     <a:masterClrMapping/>
   </p:clrMapOvr>
+  <p:timing>
+    <p:tnLst>
+      <p:par>
+        <p:cTn id="1" dur="indefinite" restart="never" nodeType="tmRoot"/>
+      </p:par>
+    </p:tnLst>
+  </p:timing>
 </p:sld>
 </file>
 
@@ -6240,7 +6296,7 @@
           <p:cNvPr id="3" name="Рисунок 2">
             <a:extLst>
               <a:ext uri="{FF2B5EF4-FFF2-40B4-BE49-F238E27FC236}">
-                <a16:creationId xmlns="" xmlns:a16="http://schemas.microsoft.com/office/drawing/2014/main" id="{7493F449-5812-F8C9-7A24-B7BF19EDEF94}"/>
+                <a16:creationId xmlns:a16="http://schemas.microsoft.com/office/drawing/2014/main" xmlns="" id="{7493F449-5812-F8C9-7A24-B7BF19EDEF94}"/>
               </a:ext>
             </a:extLst>
           </p:cNvPr>
@@ -6276,7 +6332,7 @@
           <p:cNvPr id="2" name="TextBox 1">
             <a:extLst>
               <a:ext uri="{FF2B5EF4-FFF2-40B4-BE49-F238E27FC236}">
-                <a16:creationId xmlns="" xmlns:a16="http://schemas.microsoft.com/office/drawing/2014/main" id="{08810D0D-94CA-BA31-2665-7888352D0C02}"/>
+                <a16:creationId xmlns:a16="http://schemas.microsoft.com/office/drawing/2014/main" xmlns="" id="{08810D0D-94CA-BA31-2665-7888352D0C02}"/>
               </a:ext>
             </a:extLst>
           </p:cNvPr>
@@ -6332,7 +6388,7 @@
         <p:spPr>
           <a:xfrm>
             <a:off x="1220755" y="1220763"/>
-            <a:ext cx="9801921" cy="1477328"/>
+            <a:ext cx="9801921" cy="1754326"/>
           </a:xfrm>
           <a:prstGeom prst="rect">
             <a:avLst/>
@@ -6380,7 +6436,20 @@
             </a:pPr>
             <a:r>
               <a:rPr lang="ru-RU" dirty="0"/>
-              <a:t> «Международный день толерантности». Классный час.</a:t>
+              <a:t> «Международный день толерантности». Классный час</a:t>
+            </a:r>
+            <a:r>
+              <a:rPr lang="ru-RU" dirty="0" smtClean="0"/>
+              <a:t>.</a:t>
+            </a:r>
+          </a:p>
+          <a:p>
+            <a:pPr marL="342900" indent="-342900">
+              <a:buAutoNum type="arabicPeriod"/>
+            </a:pPr>
+            <a:r>
+              <a:rPr lang="ru-RU" dirty="0" smtClean="0"/>
+              <a:t>День народного единства</a:t>
             </a:r>
             <a:endParaRPr lang="ru-RU" dirty="0" smtClean="0"/>
           </a:p>
@@ -6408,6 +6477,13 @@
   <p:clrMapOvr>
     <a:masterClrMapping/>
   </p:clrMapOvr>
+  <p:timing>
+    <p:tnLst>
+      <p:par>
+        <p:cTn id="1" dur="indefinite" restart="never" nodeType="tmRoot"/>
+      </p:par>
+    </p:tnLst>
+  </p:timing>
 </p:sld>
 </file>
 
@@ -6433,7 +6509,7 @@
           <p:cNvPr id="6" name="Рисунок 5">
             <a:extLst>
               <a:ext uri="{FF2B5EF4-FFF2-40B4-BE49-F238E27FC236}">
-                <a16:creationId xmlns="" xmlns:a16="http://schemas.microsoft.com/office/drawing/2014/main" id="{078FED99-19A8-5362-FB4B-A19B64B0790B}"/>
+                <a16:creationId xmlns:a16="http://schemas.microsoft.com/office/drawing/2014/main" xmlns="" id="{078FED99-19A8-5362-FB4B-A19B64B0790B}"/>
               </a:ext>
             </a:extLst>
           </p:cNvPr>
@@ -6469,7 +6545,7 @@
           <p:cNvPr id="2" name="TextBox 1">
             <a:extLst>
               <a:ext uri="{FF2B5EF4-FFF2-40B4-BE49-F238E27FC236}">
-                <a16:creationId xmlns="" xmlns:a16="http://schemas.microsoft.com/office/drawing/2014/main" id="{08810D0D-94CA-BA31-2665-7888352D0C02}"/>
+                <a16:creationId xmlns:a16="http://schemas.microsoft.com/office/drawing/2014/main" xmlns="" id="{08810D0D-94CA-BA31-2665-7888352D0C02}"/>
               </a:ext>
             </a:extLst>
           </p:cNvPr>
@@ -6567,6 +6643,13 @@
   <p:clrMapOvr>
     <a:masterClrMapping/>
   </p:clrMapOvr>
+  <p:timing>
+    <p:tnLst>
+      <p:par>
+        <p:cTn id="1" dur="indefinite" restart="never" nodeType="tmRoot"/>
+      </p:par>
+    </p:tnLst>
+  </p:timing>
 </p:sld>
 </file>
 

</xml_diff>